<commit_message>
Changed app code to work with local databse
</commit_message>
<xml_diff>
--- a/deliverables/European Soccer Predictions with Fifa Ratings.pptx
+++ b/deliverables/European Soccer Predictions with Fifa Ratings.pptx
@@ -2997,7 +2997,7 @@
           <a:p>
             <a:fld id="{A5C20BB3-3CCB-4FE5-991B-82F6BCB48AF3}" type="datetimeFigureOut">
               <a:rPr lang="en-US" smtClean="0"/>
-              <a:t>6/1/2020</a:t>
+              <a:t>6/5/2020</a:t>
             </a:fld>
             <a:endParaRPr lang="en-US"/>
           </a:p>
@@ -3510,7 +3510,7 @@
             <a:fld id="{B61BEF0D-F0BB-DE4B-95CE-6DB70DBA9567}" type="datetimeFigureOut">
               <a:rPr lang="en-US" dirty="0"/>
               <a:pPr/>
-              <a:t>6/1/2020</a:t>
+              <a:t>6/5/2020</a:t>
             </a:fld>
             <a:endParaRPr lang="en-US" dirty="0"/>
           </a:p>
@@ -3774,7 +3774,7 @@
             <a:fld id="{B61BEF0D-F0BB-DE4B-95CE-6DB70DBA9567}" type="datetimeFigureOut">
               <a:rPr lang="en-US" dirty="0"/>
               <a:pPr/>
-              <a:t>6/1/2020</a:t>
+              <a:t>6/5/2020</a:t>
             </a:fld>
             <a:endParaRPr lang="en-US" dirty="0"/>
           </a:p>
@@ -4011,7 +4011,7 @@
             <a:fld id="{B61BEF0D-F0BB-DE4B-95CE-6DB70DBA9567}" type="datetimeFigureOut">
               <a:rPr lang="en-US" dirty="0"/>
               <a:pPr/>
-              <a:t>6/1/2020</a:t>
+              <a:t>6/5/2020</a:t>
             </a:fld>
             <a:endParaRPr lang="en-US" dirty="0"/>
           </a:p>
@@ -4253,7 +4253,7 @@
             <a:fld id="{B61BEF0D-F0BB-DE4B-95CE-6DB70DBA9567}" type="datetimeFigureOut">
               <a:rPr lang="en-US" dirty="0"/>
               <a:pPr/>
-              <a:t>6/1/2020</a:t>
+              <a:t>6/5/2020</a:t>
             </a:fld>
             <a:endParaRPr lang="en-US" dirty="0"/>
           </a:p>
@@ -4562,7 +4562,7 @@
             <a:fld id="{B61BEF0D-F0BB-DE4B-95CE-6DB70DBA9567}" type="datetimeFigureOut">
               <a:rPr lang="en-US" dirty="0"/>
               <a:pPr/>
-              <a:t>6/1/2020</a:t>
+              <a:t>6/5/2020</a:t>
             </a:fld>
             <a:endParaRPr lang="en-US" dirty="0"/>
           </a:p>
@@ -4866,7 +4866,7 @@
             <a:fld id="{B61BEF0D-F0BB-DE4B-95CE-6DB70DBA9567}" type="datetimeFigureOut">
               <a:rPr lang="en-US" dirty="0"/>
               <a:pPr/>
-              <a:t>6/1/2020</a:t>
+              <a:t>6/5/2020</a:t>
             </a:fld>
             <a:endParaRPr lang="en-US" dirty="0"/>
           </a:p>
@@ -5290,7 +5290,7 @@
             <a:fld id="{B61BEF0D-F0BB-DE4B-95CE-6DB70DBA9567}" type="datetimeFigureOut">
               <a:rPr lang="en-US" dirty="0"/>
               <a:pPr/>
-              <a:t>6/1/2020</a:t>
+              <a:t>6/5/2020</a:t>
             </a:fld>
             <a:endParaRPr lang="en-US" dirty="0"/>
           </a:p>
@@ -5454,7 +5454,7 @@
             <a:fld id="{B61BEF0D-F0BB-DE4B-95CE-6DB70DBA9567}" type="datetimeFigureOut">
               <a:rPr lang="en-US" dirty="0"/>
               <a:pPr/>
-              <a:t>6/1/2020</a:t>
+              <a:t>6/5/2020</a:t>
             </a:fld>
             <a:endParaRPr lang="en-US" dirty="0"/>
           </a:p>
@@ -5551,7 +5551,7 @@
             <a:fld id="{B61BEF0D-F0BB-DE4B-95CE-6DB70DBA9567}" type="datetimeFigureOut">
               <a:rPr lang="en-US" dirty="0"/>
               <a:pPr/>
-              <a:t>6/1/2020</a:t>
+              <a:t>6/5/2020</a:t>
             </a:fld>
             <a:endParaRPr lang="en-US" dirty="0"/>
           </a:p>
@@ -5931,7 +5931,7 @@
             <a:fld id="{B61BEF0D-F0BB-DE4B-95CE-6DB70DBA9567}" type="datetimeFigureOut">
               <a:rPr lang="en-US" dirty="0"/>
               <a:pPr/>
-              <a:t>6/1/2020</a:t>
+              <a:t>6/5/2020</a:t>
             </a:fld>
             <a:endParaRPr lang="en-US" dirty="0"/>
           </a:p>
@@ -6222,7 +6222,7 @@
             <a:fld id="{B61BEF0D-F0BB-DE4B-95CE-6DB70DBA9567}" type="datetimeFigureOut">
               <a:rPr lang="en-US" dirty="0"/>
               <a:pPr/>
-              <a:t>6/1/2020</a:t>
+              <a:t>6/5/2020</a:t>
             </a:fld>
             <a:endParaRPr lang="en-US" dirty="0"/>
           </a:p>
@@ -6435,7 +6435,7 @@
             <a:fld id="{B61BEF0D-F0BB-DE4B-95CE-6DB70DBA9567}" type="datetimeFigureOut">
               <a:rPr lang="en-US" dirty="0"/>
               <a:pPr/>
-              <a:t>6/1/2020</a:t>
+              <a:t>6/5/2020</a:t>
             </a:fld>
             <a:endParaRPr lang="en-US" dirty="0"/>
           </a:p>
@@ -8353,7 +8353,7 @@
             <a:pPr lvl="1"/>
             <a:r>
               <a:rPr lang="en-US" dirty="0"/>
-              <a:t>Ultimately, would have been a success if we could turn a profit</a:t>
+              <a:t>Ultimately, a profits a success if we can turn a profit</a:t>
             </a:r>
           </a:p>
           <a:p>
@@ -8587,6 +8587,13 @@
             <a:r>
               <a:rPr lang="en-US" dirty="0"/>
               <a:t>Model is not too far away – Test accuracy is 50%</a:t>
+            </a:r>
+          </a:p>
+          <a:p>
+            <a:pPr lvl="1"/>
+            <a:r>
+              <a:rPr lang="en-US" dirty="0"/>
+              <a:t>And we turned a profit!</a:t>
             </a:r>
           </a:p>
           <a:p>

</xml_diff>

<commit_message>
Allows command line arguments for database location
</commit_message>
<xml_diff>
--- a/deliverables/European Soccer Predictions with Fifa Ratings.pptx
+++ b/deliverables/European Soccer Predictions with Fifa Ratings.pptx
@@ -2997,7 +2997,7 @@
           <a:p>
             <a:fld id="{A5C20BB3-3CCB-4FE5-991B-82F6BCB48AF3}" type="datetimeFigureOut">
               <a:rPr lang="en-US" smtClean="0"/>
-              <a:t>6/5/2020</a:t>
+              <a:t>6/7/2020</a:t>
             </a:fld>
             <a:endParaRPr lang="en-US"/>
           </a:p>
@@ -3510,7 +3510,7 @@
             <a:fld id="{B61BEF0D-F0BB-DE4B-95CE-6DB70DBA9567}" type="datetimeFigureOut">
               <a:rPr lang="en-US" dirty="0"/>
               <a:pPr/>
-              <a:t>6/5/2020</a:t>
+              <a:t>6/7/2020</a:t>
             </a:fld>
             <a:endParaRPr lang="en-US" dirty="0"/>
           </a:p>
@@ -3774,7 +3774,7 @@
             <a:fld id="{B61BEF0D-F0BB-DE4B-95CE-6DB70DBA9567}" type="datetimeFigureOut">
               <a:rPr lang="en-US" dirty="0"/>
               <a:pPr/>
-              <a:t>6/5/2020</a:t>
+              <a:t>6/7/2020</a:t>
             </a:fld>
             <a:endParaRPr lang="en-US" dirty="0"/>
           </a:p>
@@ -4011,7 +4011,7 @@
             <a:fld id="{B61BEF0D-F0BB-DE4B-95CE-6DB70DBA9567}" type="datetimeFigureOut">
               <a:rPr lang="en-US" dirty="0"/>
               <a:pPr/>
-              <a:t>6/5/2020</a:t>
+              <a:t>6/7/2020</a:t>
             </a:fld>
             <a:endParaRPr lang="en-US" dirty="0"/>
           </a:p>
@@ -4253,7 +4253,7 @@
             <a:fld id="{B61BEF0D-F0BB-DE4B-95CE-6DB70DBA9567}" type="datetimeFigureOut">
               <a:rPr lang="en-US" dirty="0"/>
               <a:pPr/>
-              <a:t>6/5/2020</a:t>
+              <a:t>6/7/2020</a:t>
             </a:fld>
             <a:endParaRPr lang="en-US" dirty="0"/>
           </a:p>
@@ -4562,7 +4562,7 @@
             <a:fld id="{B61BEF0D-F0BB-DE4B-95CE-6DB70DBA9567}" type="datetimeFigureOut">
               <a:rPr lang="en-US" dirty="0"/>
               <a:pPr/>
-              <a:t>6/5/2020</a:t>
+              <a:t>6/7/2020</a:t>
             </a:fld>
             <a:endParaRPr lang="en-US" dirty="0"/>
           </a:p>
@@ -4866,7 +4866,7 @@
             <a:fld id="{B61BEF0D-F0BB-DE4B-95CE-6DB70DBA9567}" type="datetimeFigureOut">
               <a:rPr lang="en-US" dirty="0"/>
               <a:pPr/>
-              <a:t>6/5/2020</a:t>
+              <a:t>6/7/2020</a:t>
             </a:fld>
             <a:endParaRPr lang="en-US" dirty="0"/>
           </a:p>
@@ -5290,7 +5290,7 @@
             <a:fld id="{B61BEF0D-F0BB-DE4B-95CE-6DB70DBA9567}" type="datetimeFigureOut">
               <a:rPr lang="en-US" dirty="0"/>
               <a:pPr/>
-              <a:t>6/5/2020</a:t>
+              <a:t>6/7/2020</a:t>
             </a:fld>
             <a:endParaRPr lang="en-US" dirty="0"/>
           </a:p>
@@ -5454,7 +5454,7 @@
             <a:fld id="{B61BEF0D-F0BB-DE4B-95CE-6DB70DBA9567}" type="datetimeFigureOut">
               <a:rPr lang="en-US" dirty="0"/>
               <a:pPr/>
-              <a:t>6/5/2020</a:t>
+              <a:t>6/7/2020</a:t>
             </a:fld>
             <a:endParaRPr lang="en-US" dirty="0"/>
           </a:p>
@@ -5551,7 +5551,7 @@
             <a:fld id="{B61BEF0D-F0BB-DE4B-95CE-6DB70DBA9567}" type="datetimeFigureOut">
               <a:rPr lang="en-US" dirty="0"/>
               <a:pPr/>
-              <a:t>6/5/2020</a:t>
+              <a:t>6/7/2020</a:t>
             </a:fld>
             <a:endParaRPr lang="en-US" dirty="0"/>
           </a:p>
@@ -5931,7 +5931,7 @@
             <a:fld id="{B61BEF0D-F0BB-DE4B-95CE-6DB70DBA9567}" type="datetimeFigureOut">
               <a:rPr lang="en-US" dirty="0"/>
               <a:pPr/>
-              <a:t>6/5/2020</a:t>
+              <a:t>6/7/2020</a:t>
             </a:fld>
             <a:endParaRPr lang="en-US" dirty="0"/>
           </a:p>
@@ -6222,7 +6222,7 @@
             <a:fld id="{B61BEF0D-F0BB-DE4B-95CE-6DB70DBA9567}" type="datetimeFigureOut">
               <a:rPr lang="en-US" dirty="0"/>
               <a:pPr/>
-              <a:t>6/5/2020</a:t>
+              <a:t>6/7/2020</a:t>
             </a:fld>
             <a:endParaRPr lang="en-US" dirty="0"/>
           </a:p>
@@ -6435,7 +6435,7 @@
             <a:fld id="{B61BEF0D-F0BB-DE4B-95CE-6DB70DBA9567}" type="datetimeFigureOut">
               <a:rPr lang="en-US" dirty="0"/>
               <a:pPr/>
-              <a:t>6/5/2020</a:t>
+              <a:t>6/7/2020</a:t>
             </a:fld>
             <a:endParaRPr lang="en-US" dirty="0"/>
           </a:p>
@@ -8353,7 +8353,7 @@
             <a:pPr lvl="1"/>
             <a:r>
               <a:rPr lang="en-US" dirty="0"/>
-              <a:t>Ultimately, a profits a success if we can turn a profit</a:t>
+              <a:t>Ultimately, model is successful if we can turn a profit</a:t>
             </a:r>
           </a:p>
           <a:p>

</xml_diff>